<commit_message>
adds ova to gitignore
</commit_message>
<xml_diff>
--- a/docs/map_apg.pptx
+++ b/docs/map_apg.pptx
@@ -197,7 +197,7 @@
           <a:p>
             <a:fld id="{378C80DB-4411-C84F-8E36-A95F3FC6F1ED}" type="datetimeFigureOut">
               <a:rPr lang="en-US" smtClean="0"/>
-              <a:t>5/4/17</a:t>
+              <a:t>9/4/18</a:t>
             </a:fld>
             <a:endParaRPr lang="en-US"/>
           </a:p>
@@ -680,7 +680,7 @@
           <a:p>
             <a:fld id="{80D2446E-D40F-5640-A037-5083DEDCAB03}" type="datetimeFigureOut">
               <a:rPr lang="en-US" smtClean="0"/>
-              <a:t>5/4/17</a:t>
+              <a:t>9/4/18</a:t>
             </a:fld>
             <a:endParaRPr lang="en-US" dirty="0"/>
           </a:p>
@@ -850,7 +850,7 @@
           <a:p>
             <a:fld id="{80D2446E-D40F-5640-A037-5083DEDCAB03}" type="datetimeFigureOut">
               <a:rPr lang="en-US" smtClean="0"/>
-              <a:t>5/4/17</a:t>
+              <a:t>9/4/18</a:t>
             </a:fld>
             <a:endParaRPr lang="en-US" dirty="0"/>
           </a:p>
@@ -1030,7 +1030,7 @@
           <a:p>
             <a:fld id="{80D2446E-D40F-5640-A037-5083DEDCAB03}" type="datetimeFigureOut">
               <a:rPr lang="en-US" smtClean="0"/>
-              <a:t>5/4/17</a:t>
+              <a:t>9/4/18</a:t>
             </a:fld>
             <a:endParaRPr lang="en-US" dirty="0"/>
           </a:p>
@@ -1200,7 +1200,7 @@
           <a:p>
             <a:fld id="{80D2446E-D40F-5640-A037-5083DEDCAB03}" type="datetimeFigureOut">
               <a:rPr lang="en-US" smtClean="0"/>
-              <a:t>5/4/17</a:t>
+              <a:t>9/4/18</a:t>
             </a:fld>
             <a:endParaRPr lang="en-US" dirty="0"/>
           </a:p>
@@ -1446,7 +1446,7 @@
           <a:p>
             <a:fld id="{80D2446E-D40F-5640-A037-5083DEDCAB03}" type="datetimeFigureOut">
               <a:rPr lang="en-US" smtClean="0"/>
-              <a:t>5/4/17</a:t>
+              <a:t>9/4/18</a:t>
             </a:fld>
             <a:endParaRPr lang="en-US" dirty="0"/>
           </a:p>
@@ -1678,7 +1678,7 @@
           <a:p>
             <a:fld id="{80D2446E-D40F-5640-A037-5083DEDCAB03}" type="datetimeFigureOut">
               <a:rPr lang="en-US" smtClean="0"/>
-              <a:t>5/4/17</a:t>
+              <a:t>9/4/18</a:t>
             </a:fld>
             <a:endParaRPr lang="en-US" dirty="0"/>
           </a:p>
@@ -2045,7 +2045,7 @@
           <a:p>
             <a:fld id="{80D2446E-D40F-5640-A037-5083DEDCAB03}" type="datetimeFigureOut">
               <a:rPr lang="en-US" smtClean="0"/>
-              <a:t>5/4/17</a:t>
+              <a:t>9/4/18</a:t>
             </a:fld>
             <a:endParaRPr lang="en-US" dirty="0"/>
           </a:p>
@@ -2163,7 +2163,7 @@
           <a:p>
             <a:fld id="{80D2446E-D40F-5640-A037-5083DEDCAB03}" type="datetimeFigureOut">
               <a:rPr lang="en-US" smtClean="0"/>
-              <a:t>5/4/17</a:t>
+              <a:t>9/4/18</a:t>
             </a:fld>
             <a:endParaRPr lang="en-US" dirty="0"/>
           </a:p>
@@ -2258,7 +2258,7 @@
           <a:p>
             <a:fld id="{80D2446E-D40F-5640-A037-5083DEDCAB03}" type="datetimeFigureOut">
               <a:rPr lang="en-US" smtClean="0"/>
-              <a:t>5/4/17</a:t>
+              <a:t>9/4/18</a:t>
             </a:fld>
             <a:endParaRPr lang="en-US" dirty="0"/>
           </a:p>
@@ -2535,7 +2535,7 @@
           <a:p>
             <a:fld id="{80D2446E-D40F-5640-A037-5083DEDCAB03}" type="datetimeFigureOut">
               <a:rPr lang="en-US" smtClean="0"/>
-              <a:t>5/4/17</a:t>
+              <a:t>9/4/18</a:t>
             </a:fld>
             <a:endParaRPr lang="en-US" dirty="0"/>
           </a:p>
@@ -2788,7 +2788,7 @@
           <a:p>
             <a:fld id="{80D2446E-D40F-5640-A037-5083DEDCAB03}" type="datetimeFigureOut">
               <a:rPr lang="en-US" smtClean="0"/>
-              <a:t>5/4/17</a:t>
+              <a:t>9/4/18</a:t>
             </a:fld>
             <a:endParaRPr lang="en-US" dirty="0"/>
           </a:p>
@@ -3001,7 +3001,7 @@
           <a:p>
             <a:fld id="{80D2446E-D40F-5640-A037-5083DEDCAB03}" type="datetimeFigureOut">
               <a:rPr lang="en-US" smtClean="0"/>
-              <a:t>5/4/17</a:t>
+              <a:t>9/4/18</a:t>
             </a:fld>
             <a:endParaRPr lang="en-US" dirty="0"/>
           </a:p>
@@ -3406,53 +3406,275 @@
           <a:chExt cx="0" cy="0"/>
         </a:xfrm>
       </p:grpSpPr>
-      <p:pic>
-        <p:nvPicPr>
-          <p:cNvPr id="42" name="Picture 41"/>
-          <p:cNvPicPr>
-            <a:picLocks noChangeAspect="1"/>
-          </p:cNvPicPr>
-          <p:nvPr/>
-        </p:nvPicPr>
-        <p:blipFill>
-          <a:blip r:embed="rId3">
-            <a:extLst>
-              <a:ext uri="{28A0092B-C50C-407E-A947-70E740481C1C}">
-                <a14:useLocalDpi xmlns:a14="http://schemas.microsoft.com/office/drawing/2010/main" val="0"/>
-              </a:ext>
-            </a:extLst>
-          </a:blip>
-          <a:stretch>
-            <a:fillRect/>
-          </a:stretch>
-        </p:blipFill>
-        <p:spPr>
-          <a:xfrm>
-            <a:off x="3804192" y="11481"/>
-            <a:ext cx="4890370" cy="6846519"/>
-          </a:xfrm>
-          <a:prstGeom prst="rect">
-            <a:avLst/>
-          </a:prstGeom>
-        </p:spPr>
-      </p:pic>
       <p:grpSp>
         <p:nvGrpSpPr>
-          <p:cNvPr id="88" name="Group 87"/>
+          <p:cNvPr id="58" name="Group 57"/>
           <p:cNvGrpSpPr/>
           <p:nvPr/>
         </p:nvGrpSpPr>
         <p:grpSpPr>
           <a:xfrm>
-            <a:off x="-1259" y="444"/>
-            <a:ext cx="3466353" cy="6862369"/>
-            <a:chOff x="-1259" y="444"/>
-            <a:chExt cx="3466353" cy="6862369"/>
+            <a:off x="339343" y="-46299"/>
+            <a:ext cx="11198139" cy="6907586"/>
+            <a:chOff x="339343" y="-46299"/>
+            <a:chExt cx="11198139" cy="6907586"/>
           </a:xfrm>
         </p:grpSpPr>
         <p:pic>
           <p:nvPicPr>
-            <p:cNvPr id="19" name="Picture 18"/>
+            <p:cNvPr id="42" name="Picture 41"/>
+            <p:cNvPicPr>
+              <a:picLocks noChangeAspect="1"/>
+            </p:cNvPicPr>
+            <p:nvPr/>
+          </p:nvPicPr>
+          <p:blipFill>
+            <a:blip r:embed="rId3">
+              <a:extLst>
+                <a:ext uri="{28A0092B-C50C-407E-A947-70E740481C1C}">
+                  <a14:useLocalDpi xmlns:a14="http://schemas.microsoft.com/office/drawing/2010/main" val="0"/>
+                </a:ext>
+              </a:extLst>
+            </a:blip>
+            <a:stretch>
+              <a:fillRect/>
+            </a:stretch>
+          </p:blipFill>
+          <p:spPr>
+            <a:xfrm>
+              <a:off x="3804192" y="11481"/>
+              <a:ext cx="4890370" cy="6846519"/>
+            </a:xfrm>
+            <a:prstGeom prst="rect">
+              <a:avLst/>
+            </a:prstGeom>
+          </p:spPr>
+        </p:pic>
+        <p:cxnSp>
+          <p:nvCxnSpPr>
+            <p:cNvPr id="35" name="Straight Connector 34"/>
+            <p:cNvCxnSpPr>
+              <a:stCxn id="12" idx="3"/>
+            </p:cNvCxnSpPr>
+            <p:nvPr/>
+          </p:nvCxnSpPr>
+          <p:spPr>
+            <a:xfrm>
+              <a:off x="3805038" y="1141224"/>
+              <a:ext cx="1438766" cy="2311103"/>
+            </a:xfrm>
+            <a:prstGeom prst="line">
+              <a:avLst/>
+            </a:prstGeom>
+            <a:ln w="12700">
+              <a:solidFill>
+                <a:schemeClr val="tx1"/>
+              </a:solidFill>
+            </a:ln>
+          </p:spPr>
+          <p:style>
+            <a:lnRef idx="1">
+              <a:schemeClr val="accent1"/>
+            </a:lnRef>
+            <a:fillRef idx="0">
+              <a:schemeClr val="accent1"/>
+            </a:fillRef>
+            <a:effectRef idx="0">
+              <a:schemeClr val="accent1"/>
+            </a:effectRef>
+            <a:fontRef idx="minor">
+              <a:schemeClr val="tx1"/>
+            </a:fontRef>
+          </p:style>
+        </p:cxnSp>
+        <p:cxnSp>
+          <p:nvCxnSpPr>
+            <p:cNvPr id="41" name="Straight Connector 40"/>
+            <p:cNvCxnSpPr>
+              <a:stCxn id="11" idx="1"/>
+            </p:cNvCxnSpPr>
+            <p:nvPr/>
+          </p:nvCxnSpPr>
+          <p:spPr>
+            <a:xfrm flipH="1">
+              <a:off x="6899988" y="1142464"/>
+              <a:ext cx="1289734" cy="387756"/>
+            </a:xfrm>
+            <a:prstGeom prst="line">
+              <a:avLst/>
+            </a:prstGeom>
+            <a:ln w="12700">
+              <a:solidFill>
+                <a:schemeClr val="tx1"/>
+              </a:solidFill>
+            </a:ln>
+          </p:spPr>
+          <p:style>
+            <a:lnRef idx="1">
+              <a:schemeClr val="accent1"/>
+            </a:lnRef>
+            <a:fillRef idx="0">
+              <a:schemeClr val="accent1"/>
+            </a:fillRef>
+            <a:effectRef idx="0">
+              <a:schemeClr val="accent1"/>
+            </a:effectRef>
+            <a:fontRef idx="minor">
+              <a:schemeClr val="tx1"/>
+            </a:fontRef>
+          </p:style>
+        </p:cxnSp>
+        <p:cxnSp>
+          <p:nvCxnSpPr>
+            <p:cNvPr id="44" name="Straight Connector 43"/>
+            <p:cNvCxnSpPr>
+              <a:stCxn id="13" idx="1"/>
+            </p:cNvCxnSpPr>
+            <p:nvPr/>
+          </p:nvCxnSpPr>
+          <p:spPr>
+            <a:xfrm flipH="1">
+              <a:off x="4514248" y="3430291"/>
+              <a:ext cx="3675474" cy="1055082"/>
+            </a:xfrm>
+            <a:prstGeom prst="line">
+              <a:avLst/>
+            </a:prstGeom>
+            <a:ln w="12700">
+              <a:solidFill>
+                <a:schemeClr val="tx1"/>
+              </a:solidFill>
+            </a:ln>
+          </p:spPr>
+          <p:style>
+            <a:lnRef idx="1">
+              <a:schemeClr val="accent1"/>
+            </a:lnRef>
+            <a:fillRef idx="0">
+              <a:schemeClr val="accent1"/>
+            </a:fillRef>
+            <a:effectRef idx="0">
+              <a:schemeClr val="accent1"/>
+            </a:effectRef>
+            <a:fontRef idx="minor">
+              <a:schemeClr val="tx1"/>
+            </a:fontRef>
+          </p:style>
+        </p:cxnSp>
+        <p:cxnSp>
+          <p:nvCxnSpPr>
+            <p:cNvPr id="47" name="Straight Connector 46"/>
+            <p:cNvCxnSpPr>
+              <a:endCxn id="24" idx="3"/>
+            </p:cNvCxnSpPr>
+            <p:nvPr/>
+          </p:nvCxnSpPr>
+          <p:spPr>
+            <a:xfrm flipH="1" flipV="1">
+              <a:off x="3804293" y="3462124"/>
+              <a:ext cx="729206" cy="1831772"/>
+            </a:xfrm>
+            <a:prstGeom prst="line">
+              <a:avLst/>
+            </a:prstGeom>
+            <a:ln w="12700">
+              <a:solidFill>
+                <a:schemeClr val="tx1"/>
+              </a:solidFill>
+            </a:ln>
+          </p:spPr>
+          <p:style>
+            <a:lnRef idx="1">
+              <a:schemeClr val="accent1"/>
+            </a:lnRef>
+            <a:fillRef idx="0">
+              <a:schemeClr val="accent1"/>
+            </a:fillRef>
+            <a:effectRef idx="0">
+              <a:schemeClr val="accent1"/>
+            </a:effectRef>
+            <a:fontRef idx="minor">
+              <a:schemeClr val="tx1"/>
+            </a:fontRef>
+          </p:style>
+        </p:cxnSp>
+        <p:cxnSp>
+          <p:nvCxnSpPr>
+            <p:cNvPr id="51" name="Straight Connector 50"/>
+            <p:cNvCxnSpPr>
+              <a:stCxn id="22" idx="1"/>
+            </p:cNvCxnSpPr>
+            <p:nvPr/>
+          </p:nvCxnSpPr>
+          <p:spPr>
+            <a:xfrm flipH="1" flipV="1">
+              <a:off x="4632650" y="5379098"/>
+              <a:ext cx="3557061" cy="338116"/>
+            </a:xfrm>
+            <a:prstGeom prst="line">
+              <a:avLst/>
+            </a:prstGeom>
+            <a:ln w="12700">
+              <a:solidFill>
+                <a:schemeClr val="tx1"/>
+              </a:solidFill>
+            </a:ln>
+          </p:spPr>
+          <p:style>
+            <a:lnRef idx="1">
+              <a:schemeClr val="accent1"/>
+            </a:lnRef>
+            <a:fillRef idx="0">
+              <a:schemeClr val="accent1"/>
+            </a:fillRef>
+            <a:effectRef idx="0">
+              <a:schemeClr val="accent1"/>
+            </a:effectRef>
+            <a:fontRef idx="minor">
+              <a:schemeClr val="tx1"/>
+            </a:fontRef>
+          </p:style>
+        </p:cxnSp>
+        <p:cxnSp>
+          <p:nvCxnSpPr>
+            <p:cNvPr id="54" name="Straight Connector 53"/>
+            <p:cNvCxnSpPr>
+              <a:endCxn id="19" idx="3"/>
+            </p:cNvCxnSpPr>
+            <p:nvPr/>
+          </p:nvCxnSpPr>
+          <p:spPr>
+            <a:xfrm flipH="1">
+              <a:off x="3801978" y="5449078"/>
+              <a:ext cx="620732" cy="267497"/>
+            </a:xfrm>
+            <a:prstGeom prst="line">
+              <a:avLst/>
+            </a:prstGeom>
+            <a:ln w="12700">
+              <a:solidFill>
+                <a:schemeClr val="tx1"/>
+              </a:solidFill>
+            </a:ln>
+          </p:spPr>
+          <p:style>
+            <a:lnRef idx="1">
+              <a:schemeClr val="accent1"/>
+            </a:lnRef>
+            <a:fillRef idx="0">
+              <a:schemeClr val="accent1"/>
+            </a:fillRef>
+            <a:effectRef idx="0">
+              <a:schemeClr val="accent1"/>
+            </a:effectRef>
+            <a:fontRef idx="minor">
+              <a:schemeClr val="tx1"/>
+            </a:fontRef>
+          </p:style>
+        </p:cxnSp>
+        <p:pic>
+          <p:nvPicPr>
+            <p:cNvPr id="22" name="Picture 21"/>
             <p:cNvPicPr>
               <a:picLocks noChangeAspect="1"/>
             </p:cNvPicPr>
@@ -3472,8 +3694,8 @@
           </p:blipFill>
           <p:spPr>
             <a:xfrm>
-              <a:off x="-1259" y="4573389"/>
-              <a:ext cx="3466353" cy="2289424"/>
+              <a:off x="8189711" y="4573224"/>
+              <a:ext cx="3347025" cy="2287979"/>
             </a:xfrm>
             <a:prstGeom prst="rect">
               <a:avLst/>
@@ -3482,14 +3704,14 @@
         </p:pic>
         <p:sp>
           <p:nvSpPr>
-            <p:cNvPr id="18" name="TextBox 17"/>
+            <p:cNvPr id="20" name="TextBox 19"/>
             <p:cNvSpPr txBox="1"/>
             <p:nvPr/>
           </p:nvSpPr>
           <p:spPr>
             <a:xfrm>
-              <a:off x="8367" y="6537979"/>
-              <a:ext cx="1697484" cy="320021"/>
+              <a:off x="8165990" y="6540267"/>
+              <a:ext cx="1657376" cy="320492"/>
             </a:xfrm>
             <a:prstGeom prst="rect">
               <a:avLst/>
@@ -3504,7 +3726,7 @@
             <a:p>
               <a:r>
                 <a:rPr lang="en-US" sz="1200" i="1" dirty="0" smtClean="0"/>
-                <a:t>A. miamiana</a:t>
+                <a:t>A. ashmeadi</a:t>
               </a:r>
               <a:endParaRPr lang="en-US" sz="1200" i="1" dirty="0"/>
             </a:p>
@@ -3512,7 +3734,7 @@
         </p:sp>
         <p:pic>
           <p:nvPicPr>
-            <p:cNvPr id="24" name="Picture 23"/>
+            <p:cNvPr id="11" name="Picture 10"/>
             <p:cNvPicPr>
               <a:picLocks noChangeAspect="1"/>
             </p:cNvPicPr>
@@ -3532,146 +3754,7 @@
           </p:blipFill>
           <p:spPr>
             <a:xfrm>
-              <a:off x="-1259" y="2231058"/>
-              <a:ext cx="3466353" cy="2465184"/>
-            </a:xfrm>
-            <a:prstGeom prst="rect">
-              <a:avLst/>
-            </a:prstGeom>
-          </p:spPr>
-        </p:pic>
-        <p:sp>
-          <p:nvSpPr>
-            <p:cNvPr id="21" name="TextBox 20"/>
-            <p:cNvSpPr txBox="1"/>
-            <p:nvPr/>
-          </p:nvSpPr>
-          <p:spPr>
-            <a:xfrm>
-              <a:off x="0" y="4376221"/>
-              <a:ext cx="1701598" cy="276999"/>
-            </a:xfrm>
-            <a:prstGeom prst="rect">
-              <a:avLst/>
-            </a:prstGeom>
-            <a:noFill/>
-          </p:spPr>
-          <p:txBody>
-            <a:bodyPr wrap="square" rtlCol="0">
-              <a:spAutoFit/>
-            </a:bodyPr>
-            <a:lstStyle/>
-            <a:p>
-              <a:r>
-                <a:rPr lang="en-US" sz="1200" i="1" dirty="0" smtClean="0"/>
-                <a:t>A. </a:t>
-              </a:r>
-              <a:r>
-                <a:rPr lang="en-US" sz="1200" i="1" dirty="0" err="1" smtClean="0"/>
-                <a:t>floridana</a:t>
-              </a:r>
-              <a:endParaRPr lang="en-US" sz="1200" i="1" dirty="0"/>
-            </a:p>
-          </p:txBody>
-        </p:sp>
-        <p:pic>
-          <p:nvPicPr>
-            <p:cNvPr id="12" name="Picture 11"/>
-            <p:cNvPicPr>
-              <a:picLocks noChangeAspect="1"/>
-            </p:cNvPicPr>
-            <p:nvPr/>
-          </p:nvPicPr>
-          <p:blipFill>
-            <a:blip r:embed="rId6">
-              <a:extLst>
-                <a:ext uri="{28A0092B-C50C-407E-A947-70E740481C1C}">
-                  <a14:useLocalDpi xmlns:a14="http://schemas.microsoft.com/office/drawing/2010/main" val="0"/>
-                </a:ext>
-              </a:extLst>
-            </a:blip>
-            <a:stretch>
-              <a:fillRect/>
-            </a:stretch>
-          </p:blipFill>
-          <p:spPr>
-            <a:xfrm>
-              <a:off x="0" y="444"/>
-              <a:ext cx="3461451" cy="2284612"/>
-            </a:xfrm>
-            <a:prstGeom prst="rect">
-              <a:avLst/>
-            </a:prstGeom>
-          </p:spPr>
-        </p:pic>
-        <p:sp>
-          <p:nvSpPr>
-            <p:cNvPr id="15" name="TextBox 14"/>
-            <p:cNvSpPr txBox="1"/>
-            <p:nvPr/>
-          </p:nvSpPr>
-          <p:spPr>
-            <a:xfrm>
-              <a:off x="0" y="1965034"/>
-              <a:ext cx="1701598" cy="320021"/>
-            </a:xfrm>
-            <a:prstGeom prst="rect">
-              <a:avLst/>
-            </a:prstGeom>
-            <a:noFill/>
-          </p:spPr>
-          <p:txBody>
-            <a:bodyPr wrap="square" rtlCol="0">
-              <a:spAutoFit/>
-            </a:bodyPr>
-            <a:lstStyle/>
-            <a:p>
-              <a:r>
-                <a:rPr lang="en-US" sz="1200" i="1" dirty="0" smtClean="0"/>
-                <a:t>A. rudis</a:t>
-              </a:r>
-              <a:endParaRPr lang="en-US" sz="1200" i="1" dirty="0"/>
-            </a:p>
-          </p:txBody>
-        </p:sp>
-      </p:grpSp>
-      <p:grpSp>
-        <p:nvGrpSpPr>
-          <p:cNvPr id="78" name="Group 77"/>
-          <p:cNvGrpSpPr/>
-          <p:nvPr/>
-        </p:nvGrpSpPr>
-        <p:grpSpPr>
-          <a:xfrm>
-            <a:off x="8843494" y="0"/>
-            <a:ext cx="3348506" cy="6862729"/>
-            <a:chOff x="8843494" y="0"/>
-            <a:chExt cx="3348506" cy="6862729"/>
-          </a:xfrm>
-        </p:grpSpPr>
-        <p:pic>
-          <p:nvPicPr>
-            <p:cNvPr id="11" name="Picture 10"/>
-            <p:cNvPicPr>
-              <a:picLocks noChangeAspect="1"/>
-            </p:cNvPicPr>
-            <p:nvPr/>
-          </p:nvPicPr>
-          <p:blipFill>
-            <a:blip r:embed="rId7">
-              <a:extLst>
-                <a:ext uri="{28A0092B-C50C-407E-A947-70E740481C1C}">
-                  <a14:useLocalDpi xmlns:a14="http://schemas.microsoft.com/office/drawing/2010/main" val="0"/>
-                </a:ext>
-              </a:extLst>
-            </a:blip>
-            <a:stretch>
-              <a:fillRect/>
-            </a:stretch>
-          </p:blipFill>
-          <p:spPr>
-            <a:xfrm>
-              <a:off x="8844240" y="0"/>
+              <a:off x="8189722" y="-1526"/>
               <a:ext cx="3347760" cy="2287979"/>
             </a:xfrm>
             <a:prstGeom prst="rect">
@@ -3687,7 +3770,7 @@
           </p:nvSpPr>
           <p:spPr>
             <a:xfrm>
-              <a:off x="8844240" y="1960177"/>
+              <a:off x="8189722" y="1958651"/>
               <a:ext cx="1645710" cy="320492"/>
             </a:xfrm>
             <a:prstGeom prst="rect">
@@ -3709,6 +3792,35 @@
             </a:p>
           </p:txBody>
         </p:sp>
+        <p:sp>
+          <p:nvSpPr>
+            <p:cNvPr id="25" name="Rectangle 24"/>
+            <p:cNvSpPr/>
+            <p:nvPr/>
+          </p:nvSpPr>
+          <p:spPr>
+            <a:xfrm>
+              <a:off x="8188976" y="-46299"/>
+              <a:ext cx="309700" cy="369332"/>
+            </a:xfrm>
+            <a:prstGeom prst="rect">
+              <a:avLst/>
+            </a:prstGeom>
+          </p:spPr>
+          <p:txBody>
+            <a:bodyPr wrap="none">
+              <a:spAutoFit/>
+            </a:bodyPr>
+            <a:lstStyle/>
+            <a:p>
+              <a:r>
+                <a:rPr lang="en-US" dirty="0" smtClean="0"/>
+                <a:t>B</a:t>
+              </a:r>
+              <a:endParaRPr lang="en-US" dirty="0"/>
+            </a:p>
+          </p:txBody>
+        </p:sp>
         <p:pic>
           <p:nvPicPr>
             <p:cNvPr id="13" name="Picture 12"/>
@@ -3718,7 +3830,7 @@
             <p:nvPr/>
           </p:nvPicPr>
           <p:blipFill>
-            <a:blip r:embed="rId8">
+            <a:blip r:embed="rId6">
               <a:extLst>
                 <a:ext uri="{28A0092B-C50C-407E-A947-70E740481C1C}">
                   <a14:useLocalDpi xmlns:a14="http://schemas.microsoft.com/office/drawing/2010/main" val="0"/>
@@ -3731,7 +3843,7 @@
           </p:blipFill>
           <p:spPr>
             <a:xfrm>
-              <a:off x="8844240" y="2287827"/>
+              <a:off x="8189722" y="2286301"/>
               <a:ext cx="3347760" cy="2287979"/>
             </a:xfrm>
             <a:prstGeom prst="rect">
@@ -3747,7 +3859,7 @@
           </p:nvSpPr>
           <p:spPr>
             <a:xfrm>
-              <a:off x="8844240" y="4244428"/>
+              <a:off x="8189722" y="4242902"/>
               <a:ext cx="1645710" cy="320492"/>
             </a:xfrm>
             <a:prstGeom prst="rect">
@@ -3769,23 +3881,318 @@
             </a:p>
           </p:txBody>
         </p:sp>
+        <p:sp>
+          <p:nvSpPr>
+            <p:cNvPr id="27" name="Rectangle 26"/>
+            <p:cNvSpPr/>
+            <p:nvPr/>
+          </p:nvSpPr>
+          <p:spPr>
+            <a:xfrm>
+              <a:off x="8188976" y="2224042"/>
+              <a:ext cx="330540" cy="369332"/>
+            </a:xfrm>
+            <a:prstGeom prst="rect">
+              <a:avLst/>
+            </a:prstGeom>
+          </p:spPr>
+          <p:txBody>
+            <a:bodyPr wrap="none">
+              <a:spAutoFit/>
+            </a:bodyPr>
+            <a:lstStyle/>
+            <a:p>
+              <a:r>
+                <a:rPr lang="en-US" dirty="0"/>
+                <a:t>D</a:t>
+              </a:r>
+              <a:endParaRPr lang="en-US" dirty="0"/>
+            </a:p>
+          </p:txBody>
+        </p:sp>
+        <p:sp>
+          <p:nvSpPr>
+            <p:cNvPr id="29" name="Rectangle 28"/>
+            <p:cNvSpPr/>
+            <p:nvPr/>
+          </p:nvSpPr>
+          <p:spPr>
+            <a:xfrm>
+              <a:off x="8208212" y="4546139"/>
+              <a:ext cx="290464" cy="369332"/>
+            </a:xfrm>
+            <a:prstGeom prst="rect">
+              <a:avLst/>
+            </a:prstGeom>
+          </p:spPr>
+          <p:txBody>
+            <a:bodyPr wrap="none">
+              <a:spAutoFit/>
+            </a:bodyPr>
+            <a:lstStyle/>
+            <a:p>
+              <a:r>
+                <a:rPr lang="en-US" dirty="0" smtClean="0"/>
+                <a:t>F</a:t>
+              </a:r>
+              <a:endParaRPr lang="en-US" dirty="0"/>
+            </a:p>
+          </p:txBody>
+        </p:sp>
+        <p:sp>
+          <p:nvSpPr>
+            <p:cNvPr id="32" name="Rectangle 31"/>
+            <p:cNvSpPr/>
+            <p:nvPr/>
+          </p:nvSpPr>
+          <p:spPr>
+            <a:xfrm>
+              <a:off x="3774669" y="-46299"/>
+              <a:ext cx="332142" cy="369332"/>
+            </a:xfrm>
+            <a:prstGeom prst="rect">
+              <a:avLst/>
+            </a:prstGeom>
+          </p:spPr>
+          <p:txBody>
+            <a:bodyPr wrap="none">
+              <a:spAutoFit/>
+            </a:bodyPr>
+            <a:lstStyle/>
+            <a:p>
+              <a:r>
+                <a:rPr lang="en-US" dirty="0" smtClean="0"/>
+                <a:t>G</a:t>
+              </a:r>
+              <a:endParaRPr lang="en-US" dirty="0"/>
+            </a:p>
+          </p:txBody>
+        </p:sp>
         <p:grpSp>
           <p:nvGrpSpPr>
-            <p:cNvPr id="76" name="Group 75"/>
+            <p:cNvPr id="5" name="Group 4"/>
             <p:cNvGrpSpPr/>
             <p:nvPr/>
           </p:nvGrpSpPr>
           <p:grpSpPr>
             <a:xfrm>
-              <a:off x="8843494" y="4574750"/>
-              <a:ext cx="3347760" cy="2287979"/>
-              <a:chOff x="8843494" y="4574750"/>
-              <a:chExt cx="3347760" cy="2287979"/>
+              <a:off x="339343" y="4571863"/>
+              <a:ext cx="3462635" cy="2289424"/>
+              <a:chOff x="-4244" y="4573389"/>
+              <a:chExt cx="3469338" cy="2289424"/>
             </a:xfrm>
           </p:grpSpPr>
           <p:pic>
             <p:nvPicPr>
-              <p:cNvPr id="22" name="Picture 21"/>
+              <p:cNvPr id="19" name="Picture 18"/>
+              <p:cNvPicPr>
+                <a:picLocks noChangeAspect="1"/>
+              </p:cNvPicPr>
+              <p:nvPr/>
+            </p:nvPicPr>
+            <p:blipFill>
+              <a:blip r:embed="rId7">
+                <a:extLst>
+                  <a:ext uri="{28A0092B-C50C-407E-A947-70E740481C1C}">
+                    <a14:useLocalDpi xmlns:a14="http://schemas.microsoft.com/office/drawing/2010/main" val="0"/>
+                  </a:ext>
+                </a:extLst>
+              </a:blip>
+              <a:stretch>
+                <a:fillRect/>
+              </a:stretch>
+            </p:blipFill>
+            <p:spPr>
+              <a:xfrm>
+                <a:off x="-1259" y="4573389"/>
+                <a:ext cx="3466353" cy="2289424"/>
+              </a:xfrm>
+              <a:prstGeom prst="rect">
+                <a:avLst/>
+              </a:prstGeom>
+            </p:spPr>
+          </p:pic>
+          <p:sp>
+            <p:nvSpPr>
+              <p:cNvPr id="18" name="TextBox 17"/>
+              <p:cNvSpPr txBox="1"/>
+              <p:nvPr/>
+            </p:nvSpPr>
+            <p:spPr>
+              <a:xfrm>
+                <a:off x="8367" y="6537979"/>
+                <a:ext cx="1697484" cy="320021"/>
+              </a:xfrm>
+              <a:prstGeom prst="rect">
+                <a:avLst/>
+              </a:prstGeom>
+              <a:noFill/>
+            </p:spPr>
+            <p:txBody>
+              <a:bodyPr wrap="square" rtlCol="0">
+                <a:spAutoFit/>
+              </a:bodyPr>
+              <a:lstStyle/>
+              <a:p>
+                <a:r>
+                  <a:rPr lang="en-US" sz="1200" i="1" dirty="0" smtClean="0"/>
+                  <a:t>A. miamiana</a:t>
+                </a:r>
+                <a:endParaRPr lang="en-US" sz="1200" i="1" dirty="0"/>
+              </a:p>
+            </p:txBody>
+          </p:sp>
+          <p:sp>
+            <p:nvSpPr>
+              <p:cNvPr id="28" name="Rectangle 27"/>
+              <p:cNvSpPr/>
+              <p:nvPr/>
+            </p:nvSpPr>
+            <p:spPr>
+              <a:xfrm>
+                <a:off x="-4244" y="4635573"/>
+                <a:ext cx="296876" cy="369332"/>
+              </a:xfrm>
+              <a:prstGeom prst="rect">
+                <a:avLst/>
+              </a:prstGeom>
+            </p:spPr>
+            <p:txBody>
+              <a:bodyPr wrap="none">
+                <a:spAutoFit/>
+              </a:bodyPr>
+              <a:lstStyle/>
+              <a:p>
+                <a:r>
+                  <a:rPr lang="en-US" dirty="0" smtClean="0"/>
+                  <a:t>E</a:t>
+                </a:r>
+                <a:endParaRPr lang="en-US" dirty="0"/>
+              </a:p>
+            </p:txBody>
+          </p:sp>
+        </p:grpSp>
+        <p:grpSp>
+          <p:nvGrpSpPr>
+            <p:cNvPr id="4" name="Group 3"/>
+            <p:cNvGrpSpPr/>
+            <p:nvPr/>
+          </p:nvGrpSpPr>
+          <p:grpSpPr>
+            <a:xfrm>
+              <a:off x="339945" y="2224042"/>
+              <a:ext cx="3464348" cy="2470674"/>
+              <a:chOff x="-3643" y="2225568"/>
+              <a:chExt cx="3468737" cy="2470674"/>
+            </a:xfrm>
+          </p:grpSpPr>
+          <p:pic>
+            <p:nvPicPr>
+              <p:cNvPr id="24" name="Picture 23"/>
+              <p:cNvPicPr>
+                <a:picLocks noChangeAspect="1"/>
+              </p:cNvPicPr>
+              <p:nvPr/>
+            </p:nvPicPr>
+            <p:blipFill>
+              <a:blip r:embed="rId8">
+                <a:extLst>
+                  <a:ext uri="{28A0092B-C50C-407E-A947-70E740481C1C}">
+                    <a14:useLocalDpi xmlns:a14="http://schemas.microsoft.com/office/drawing/2010/main" val="0"/>
+                  </a:ext>
+                </a:extLst>
+              </a:blip>
+              <a:stretch>
+                <a:fillRect/>
+              </a:stretch>
+            </p:blipFill>
+            <p:spPr>
+              <a:xfrm>
+                <a:off x="-1259" y="2231058"/>
+                <a:ext cx="3466353" cy="2465184"/>
+              </a:xfrm>
+              <a:prstGeom prst="rect">
+                <a:avLst/>
+              </a:prstGeom>
+            </p:spPr>
+          </p:pic>
+          <p:sp>
+            <p:nvSpPr>
+              <p:cNvPr id="21" name="TextBox 20"/>
+              <p:cNvSpPr txBox="1"/>
+              <p:nvPr/>
+            </p:nvSpPr>
+            <p:spPr>
+              <a:xfrm>
+                <a:off x="0" y="4376221"/>
+                <a:ext cx="1701598" cy="276999"/>
+              </a:xfrm>
+              <a:prstGeom prst="rect">
+                <a:avLst/>
+              </a:prstGeom>
+              <a:noFill/>
+            </p:spPr>
+            <p:txBody>
+              <a:bodyPr wrap="square" rtlCol="0">
+                <a:spAutoFit/>
+              </a:bodyPr>
+              <a:lstStyle/>
+              <a:p>
+                <a:r>
+                  <a:rPr lang="en-US" sz="1200" i="1" dirty="0" smtClean="0"/>
+                  <a:t>A. floridana</a:t>
+                </a:r>
+                <a:endParaRPr lang="en-US" sz="1200" i="1" dirty="0"/>
+              </a:p>
+            </p:txBody>
+          </p:sp>
+          <p:sp>
+            <p:nvSpPr>
+              <p:cNvPr id="26" name="Rectangle 25"/>
+              <p:cNvSpPr/>
+              <p:nvPr/>
+            </p:nvSpPr>
+            <p:spPr>
+              <a:xfrm>
+                <a:off x="-3643" y="2225568"/>
+                <a:ext cx="306494" cy="369332"/>
+              </a:xfrm>
+              <a:prstGeom prst="rect">
+                <a:avLst/>
+              </a:prstGeom>
+            </p:spPr>
+            <p:txBody>
+              <a:bodyPr wrap="none">
+                <a:spAutoFit/>
+              </a:bodyPr>
+              <a:lstStyle/>
+              <a:p>
+                <a:r>
+                  <a:rPr lang="en-US" dirty="0" smtClean="0"/>
+                  <a:t>C</a:t>
+                </a:r>
+                <a:endParaRPr lang="en-US" dirty="0"/>
+              </a:p>
+            </p:txBody>
+          </p:sp>
+        </p:grpSp>
+        <p:grpSp>
+          <p:nvGrpSpPr>
+            <p:cNvPr id="3" name="Group 2"/>
+            <p:cNvGrpSpPr/>
+            <p:nvPr/>
+          </p:nvGrpSpPr>
+          <p:grpSpPr>
+            <a:xfrm>
+              <a:off x="339944" y="-46299"/>
+              <a:ext cx="3465094" cy="2329829"/>
+              <a:chOff x="-3643" y="-44773"/>
+              <a:chExt cx="3465094" cy="2329829"/>
+            </a:xfrm>
+          </p:grpSpPr>
+          <p:pic>
+            <p:nvPicPr>
+              <p:cNvPr id="12" name="Picture 11"/>
               <p:cNvPicPr>
                 <a:picLocks noChangeAspect="1"/>
               </p:cNvPicPr>
@@ -3805,8 +4212,8 @@
             </p:blipFill>
             <p:spPr>
               <a:xfrm>
-                <a:off x="8843494" y="4574750"/>
-                <a:ext cx="3347760" cy="2287979"/>
+                <a:off x="0" y="444"/>
+                <a:ext cx="3461451" cy="2284612"/>
               </a:xfrm>
               <a:prstGeom prst="rect">
                 <a:avLst/>
@@ -3815,14 +4222,14 @@
           </p:pic>
           <p:sp>
             <p:nvSpPr>
-              <p:cNvPr id="20" name="TextBox 19"/>
+              <p:cNvPr id="15" name="TextBox 14"/>
               <p:cNvSpPr txBox="1"/>
               <p:nvPr/>
             </p:nvSpPr>
             <p:spPr>
               <a:xfrm>
-                <a:off x="8844235" y="6541793"/>
-                <a:ext cx="1645710" cy="320492"/>
+                <a:off x="0" y="1965034"/>
+                <a:ext cx="1701598" cy="320021"/>
               </a:xfrm>
               <a:prstGeom prst="rect">
                 <a:avLst/>
@@ -3837,236 +4244,43 @@
               <a:p>
                 <a:r>
                   <a:rPr lang="en-US" sz="1200" i="1" dirty="0" smtClean="0"/>
-                  <a:t>A. ashmeadi</a:t>
+                  <a:t>A. rudis</a:t>
                 </a:r>
                 <a:endParaRPr lang="en-US" sz="1200" i="1" dirty="0"/>
               </a:p>
             </p:txBody>
           </p:sp>
+          <p:sp>
+            <p:nvSpPr>
+              <p:cNvPr id="2" name="Rectangle 1"/>
+              <p:cNvSpPr/>
+              <p:nvPr/>
+            </p:nvSpPr>
+            <p:spPr>
+              <a:xfrm>
+                <a:off x="-3643" y="-44773"/>
+                <a:ext cx="324128" cy="369332"/>
+              </a:xfrm>
+              <a:prstGeom prst="rect">
+                <a:avLst/>
+              </a:prstGeom>
+            </p:spPr>
+            <p:txBody>
+              <a:bodyPr wrap="none">
+                <a:spAutoFit/>
+              </a:bodyPr>
+              <a:lstStyle/>
+              <a:p>
+                <a:r>
+                  <a:rPr lang="en-US" dirty="0" smtClean="0"/>
+                  <a:t>A</a:t>
+                </a:r>
+                <a:endParaRPr lang="en-US" dirty="0"/>
+              </a:p>
+            </p:txBody>
+          </p:sp>
         </p:grpSp>
       </p:grpSp>
-      <p:cxnSp>
-        <p:nvCxnSpPr>
-          <p:cNvPr id="35" name="Straight Connector 34"/>
-          <p:cNvCxnSpPr>
-            <a:stCxn id="12" idx="3"/>
-          </p:cNvCxnSpPr>
-          <p:nvPr/>
-        </p:nvCxnSpPr>
-        <p:spPr>
-          <a:xfrm>
-            <a:off x="3461451" y="1142750"/>
-            <a:ext cx="1777299" cy="2333716"/>
-          </a:xfrm>
-          <a:prstGeom prst="line">
-            <a:avLst/>
-          </a:prstGeom>
-          <a:ln w="12700">
-            <a:solidFill>
-              <a:schemeClr val="tx1"/>
-            </a:solidFill>
-          </a:ln>
-        </p:spPr>
-        <p:style>
-          <a:lnRef idx="1">
-            <a:schemeClr val="accent1"/>
-          </a:lnRef>
-          <a:fillRef idx="0">
-            <a:schemeClr val="accent1"/>
-          </a:fillRef>
-          <a:effectRef idx="0">
-            <a:schemeClr val="accent1"/>
-          </a:effectRef>
-          <a:fontRef idx="minor">
-            <a:schemeClr val="tx1"/>
-          </a:fontRef>
-        </p:style>
-      </p:cxnSp>
-      <p:cxnSp>
-        <p:nvCxnSpPr>
-          <p:cNvPr id="41" name="Straight Connector 40"/>
-          <p:cNvCxnSpPr>
-            <a:stCxn id="11" idx="1"/>
-          </p:cNvCxnSpPr>
-          <p:nvPr/>
-        </p:nvCxnSpPr>
-        <p:spPr>
-          <a:xfrm flipH="1">
-            <a:off x="6896100" y="1143990"/>
-            <a:ext cx="1948140" cy="391047"/>
-          </a:xfrm>
-          <a:prstGeom prst="line">
-            <a:avLst/>
-          </a:prstGeom>
-          <a:ln w="12700">
-            <a:solidFill>
-              <a:schemeClr val="tx1"/>
-            </a:solidFill>
-          </a:ln>
-        </p:spPr>
-        <p:style>
-          <a:lnRef idx="1">
-            <a:schemeClr val="accent1"/>
-          </a:lnRef>
-          <a:fillRef idx="0">
-            <a:schemeClr val="accent1"/>
-          </a:fillRef>
-          <a:effectRef idx="0">
-            <a:schemeClr val="accent1"/>
-          </a:effectRef>
-          <a:fontRef idx="minor">
-            <a:schemeClr val="tx1"/>
-          </a:fontRef>
-        </p:style>
-      </p:cxnSp>
-      <p:cxnSp>
-        <p:nvCxnSpPr>
-          <p:cNvPr id="44" name="Straight Connector 43"/>
-          <p:cNvCxnSpPr>
-            <a:stCxn id="13" idx="1"/>
-          </p:cNvCxnSpPr>
-          <p:nvPr/>
-        </p:nvCxnSpPr>
-        <p:spPr>
-          <a:xfrm flipH="1">
-            <a:off x="4514850" y="3431817"/>
-            <a:ext cx="4329390" cy="1052644"/>
-          </a:xfrm>
-          <a:prstGeom prst="line">
-            <a:avLst/>
-          </a:prstGeom>
-          <a:ln w="12700">
-            <a:solidFill>
-              <a:schemeClr val="tx1"/>
-            </a:solidFill>
-          </a:ln>
-        </p:spPr>
-        <p:style>
-          <a:lnRef idx="1">
-            <a:schemeClr val="accent1"/>
-          </a:lnRef>
-          <a:fillRef idx="0">
-            <a:schemeClr val="accent1"/>
-          </a:fillRef>
-          <a:effectRef idx="0">
-            <a:schemeClr val="accent1"/>
-          </a:effectRef>
-          <a:fontRef idx="minor">
-            <a:schemeClr val="tx1"/>
-          </a:fontRef>
-        </p:style>
-      </p:cxnSp>
-      <p:cxnSp>
-        <p:nvCxnSpPr>
-          <p:cNvPr id="47" name="Straight Connector 46"/>
-          <p:cNvCxnSpPr>
-            <a:endCxn id="24" idx="3"/>
-          </p:cNvCxnSpPr>
-          <p:nvPr/>
-        </p:nvCxnSpPr>
-        <p:spPr>
-          <a:xfrm flipH="1" flipV="1">
-            <a:off x="3465094" y="3463650"/>
-            <a:ext cx="1029904" cy="1849496"/>
-          </a:xfrm>
-          <a:prstGeom prst="line">
-            <a:avLst/>
-          </a:prstGeom>
-          <a:ln w="12700">
-            <a:solidFill>
-              <a:schemeClr val="tx1"/>
-            </a:solidFill>
-          </a:ln>
-        </p:spPr>
-        <p:style>
-          <a:lnRef idx="1">
-            <a:schemeClr val="accent1"/>
-          </a:lnRef>
-          <a:fillRef idx="0">
-            <a:schemeClr val="accent1"/>
-          </a:fillRef>
-          <a:effectRef idx="0">
-            <a:schemeClr val="accent1"/>
-          </a:effectRef>
-          <a:fontRef idx="minor">
-            <a:schemeClr val="tx1"/>
-          </a:fontRef>
-        </p:style>
-      </p:cxnSp>
-      <p:cxnSp>
-        <p:nvCxnSpPr>
-          <p:cNvPr id="51" name="Straight Connector 50"/>
-          <p:cNvCxnSpPr>
-            <a:stCxn id="22" idx="1"/>
-          </p:cNvCxnSpPr>
-          <p:nvPr/>
-        </p:nvCxnSpPr>
-        <p:spPr>
-          <a:xfrm flipH="1" flipV="1">
-            <a:off x="4629150" y="5371991"/>
-            <a:ext cx="4214344" cy="346749"/>
-          </a:xfrm>
-          <a:prstGeom prst="line">
-            <a:avLst/>
-          </a:prstGeom>
-          <a:ln w="12700">
-            <a:solidFill>
-              <a:schemeClr val="tx1"/>
-            </a:solidFill>
-          </a:ln>
-        </p:spPr>
-        <p:style>
-          <a:lnRef idx="1">
-            <a:schemeClr val="accent1"/>
-          </a:lnRef>
-          <a:fillRef idx="0">
-            <a:schemeClr val="accent1"/>
-          </a:fillRef>
-          <a:effectRef idx="0">
-            <a:schemeClr val="accent1"/>
-          </a:effectRef>
-          <a:fontRef idx="minor">
-            <a:schemeClr val="tx1"/>
-          </a:fontRef>
-        </p:style>
-      </p:cxnSp>
-      <p:cxnSp>
-        <p:nvCxnSpPr>
-          <p:cNvPr id="54" name="Straight Connector 53"/>
-          <p:cNvCxnSpPr>
-            <a:endCxn id="19" idx="3"/>
-          </p:cNvCxnSpPr>
-          <p:nvPr/>
-        </p:nvCxnSpPr>
-        <p:spPr>
-          <a:xfrm flipH="1">
-            <a:off x="3465094" y="5447899"/>
-            <a:ext cx="943278" cy="270202"/>
-          </a:xfrm>
-          <a:prstGeom prst="line">
-            <a:avLst/>
-          </a:prstGeom>
-          <a:ln w="12700">
-            <a:solidFill>
-              <a:schemeClr val="tx1"/>
-            </a:solidFill>
-          </a:ln>
-        </p:spPr>
-        <p:style>
-          <a:lnRef idx="1">
-            <a:schemeClr val="accent1"/>
-          </a:lnRef>
-          <a:fillRef idx="0">
-            <a:schemeClr val="accent1"/>
-          </a:fillRef>
-          <a:effectRef idx="0">
-            <a:schemeClr val="accent1"/>
-          </a:effectRef>
-          <a:fontRef idx="minor">
-            <a:schemeClr val="tx1"/>
-          </a:fontRef>
-        </p:style>
-      </p:cxnSp>
     </p:spTree>
     <p:extLst>
       <p:ext uri="{BB962C8B-B14F-4D97-AF65-F5344CB8AC3E}">

</xml_diff>